<commit_message>
Commit updates to slides and project comments
</commit_message>
<xml_diff>
--- a/FinalProjectPresentation.pptx
+++ b/FinalProjectPresentation.pptx
@@ -11,8 +11,8 @@
     <p:sldId id="257" r:id="rId2"/>
     <p:sldId id="272" r:id="rId3"/>
     <p:sldId id="273" r:id="rId4"/>
-    <p:sldId id="274" r:id="rId5"/>
-    <p:sldId id="282" r:id="rId6"/>
+    <p:sldId id="282" r:id="rId5"/>
+    <p:sldId id="274" r:id="rId6"/>
     <p:sldId id="275" r:id="rId7"/>
     <p:sldId id="279" r:id="rId8"/>
     <p:sldId id="283" r:id="rId9"/>
@@ -4340,7 +4340,7 @@
         </p:nvSpPr>
         <p:spPr>
           <a:xfrm>
-            <a:off x="84114" y="-52349"/>
+            <a:off x="6840" y="-52349"/>
             <a:ext cx="12192000" cy="6930597"/>
           </a:xfrm>
           <a:prstGeom prst="rect">
@@ -4403,7 +4403,7 @@
         </p:nvSpPr>
         <p:spPr>
           <a:xfrm>
-            <a:off x="6738183" y="3581349"/>
+            <a:off x="6738183" y="4328323"/>
             <a:ext cx="514350" cy="669940"/>
           </a:xfrm>
           <a:prstGeom prst="ellipse">
@@ -4455,7 +4455,7 @@
         </p:nvSpPr>
         <p:spPr>
           <a:xfrm>
-            <a:off x="3816534" y="3444079"/>
+            <a:off x="3816534" y="4191053"/>
             <a:ext cx="4558941" cy="677108"/>
           </a:xfrm>
           <a:prstGeom prst="rect">
@@ -4503,7 +4503,7 @@
         </p:nvSpPr>
         <p:spPr>
           <a:xfrm>
-            <a:off x="7227465" y="3584448"/>
+            <a:off x="7227465" y="4331422"/>
             <a:ext cx="514350" cy="669940"/>
           </a:xfrm>
           <a:prstGeom prst="ellipse">
@@ -4577,54 +4577,6 @@
           <a:chExt cx="0" cy="0"/>
         </a:xfrm>
       </p:grpSpPr>
-      <p:sp>
-        <p:nvSpPr>
-          <p:cNvPr id="3" name="TextBox 2">
-            <a:extLst>
-              <a:ext uri="{FF2B5EF4-FFF2-40B4-BE49-F238E27FC236}">
-                <a16:creationId xmlns:a16="http://schemas.microsoft.com/office/drawing/2014/main" id="{DBBA7389-268A-BF4D-A4BA-8E77A0816C40}"/>
-              </a:ext>
-            </a:extLst>
-          </p:cNvPr>
-          <p:cNvSpPr txBox="1"/>
-          <p:nvPr/>
-        </p:nvSpPr>
-        <p:spPr>
-          <a:xfrm>
-            <a:off x="160421" y="6478489"/>
-            <a:ext cx="5100242" cy="369332"/>
-          </a:xfrm>
-          <a:prstGeom prst="rect">
-            <a:avLst/>
-          </a:prstGeom>
-          <a:noFill/>
-        </p:spPr>
-        <p:txBody>
-          <a:bodyPr wrap="none" rtlCol="0">
-            <a:spAutoFit/>
-          </a:bodyPr>
-          <a:lstStyle/>
-          <a:p>
-            <a:pPr algn="l"/>
-            <a:r>
-              <a:rPr lang="en-US" sz="1800" b="0" i="0" dirty="0">
-                <a:solidFill>
-                  <a:schemeClr val="tx2"/>
-                </a:solidFill>
-                <a:effectLst/>
-                <a:latin typeface="verdana" panose="020B0604030504040204" pitchFamily="34" charset="0"/>
-              </a:rPr>
-              <a:t>Most popular books based on book ratings</a:t>
-            </a:r>
-            <a:endParaRPr lang="en-US" dirty="0">
-              <a:solidFill>
-                <a:schemeClr val="tx2"/>
-              </a:solidFill>
-              <a:latin typeface="verdana" panose="020B0604030504040204" pitchFamily="34" charset="0"/>
-            </a:endParaRPr>
-          </a:p>
-        </p:txBody>
-      </p:sp>
       <p:pic>
         <p:nvPicPr>
           <p:cNvPr id="4" name="Picture 3">
@@ -4647,7 +4599,7 @@
         </p:blipFill>
         <p:spPr>
           <a:xfrm>
-            <a:off x="1384300" y="1027906"/>
+            <a:off x="1384300" y="1189455"/>
             <a:ext cx="9423400" cy="5473700"/>
           </a:xfrm>
           <a:prstGeom prst="rect">
@@ -4682,6 +4634,54 @@
               <a:rPr lang="en-US" dirty="0"/>
               <a:t>Results</a:t>
             </a:r>
+          </a:p>
+        </p:txBody>
+      </p:sp>
+      <p:sp>
+        <p:nvSpPr>
+          <p:cNvPr id="3" name="TextBox 2">
+            <a:extLst>
+              <a:ext uri="{FF2B5EF4-FFF2-40B4-BE49-F238E27FC236}">
+                <a16:creationId xmlns:a16="http://schemas.microsoft.com/office/drawing/2014/main" id="{DBBA7389-268A-BF4D-A4BA-8E77A0816C40}"/>
+              </a:ext>
+            </a:extLst>
+          </p:cNvPr>
+          <p:cNvSpPr txBox="1"/>
+          <p:nvPr/>
+        </p:nvSpPr>
+        <p:spPr>
+          <a:xfrm>
+            <a:off x="160421" y="6478489"/>
+            <a:ext cx="5100242" cy="369332"/>
+          </a:xfrm>
+          <a:prstGeom prst="rect">
+            <a:avLst/>
+          </a:prstGeom>
+          <a:noFill/>
+        </p:spPr>
+        <p:txBody>
+          <a:bodyPr wrap="none" rtlCol="0">
+            <a:spAutoFit/>
+          </a:bodyPr>
+          <a:lstStyle/>
+          <a:p>
+            <a:pPr algn="l"/>
+            <a:r>
+              <a:rPr lang="en-US" sz="1800" b="0" i="0" dirty="0">
+                <a:solidFill>
+                  <a:schemeClr val="tx2"/>
+                </a:solidFill>
+                <a:effectLst/>
+                <a:latin typeface="verdana" panose="020B0604030504040204" pitchFamily="34" charset="0"/>
+              </a:rPr>
+              <a:t>Most popular books based on book ratings</a:t>
+            </a:r>
+            <a:endParaRPr lang="en-US" dirty="0">
+              <a:solidFill>
+                <a:schemeClr val="tx2"/>
+              </a:solidFill>
+              <a:latin typeface="verdana" panose="020B0604030504040204" pitchFamily="34" charset="0"/>
+            </a:endParaRPr>
           </a:p>
         </p:txBody>
       </p:sp>
@@ -5425,13 +5425,13 @@
           <p:nvPr>
             <p:extLst>
               <p:ext uri="{D42A27DB-BD31-4B8C-83A1-F6EECF244321}">
-                <p14:modId xmlns:p14="http://schemas.microsoft.com/office/powerpoint/2010/main" val="1516507229"/>
+                <p14:modId xmlns:p14="http://schemas.microsoft.com/office/powerpoint/2010/main" val="1630310917"/>
               </p:ext>
             </p:extLst>
           </p:nvPr>
         </p:nvGraphicFramePr>
         <p:xfrm>
-          <a:off x="5526058" y="5383202"/>
+          <a:off x="5526058" y="5396081"/>
           <a:ext cx="4364978" cy="283845"/>
         </p:xfrm>
         <a:graphic>
@@ -5545,7 +5545,7 @@
         </p:nvCxnSpPr>
         <p:spPr>
           <a:xfrm>
-            <a:off x="4347411" y="5580563"/>
+            <a:off x="4347411" y="5593442"/>
             <a:ext cx="946484" cy="0"/>
           </a:xfrm>
           <a:prstGeom prst="straightConnector1">
@@ -5570,6 +5570,47 @@
           </a:fontRef>
         </p:style>
       </p:cxnSp>
+      <p:sp>
+        <p:nvSpPr>
+          <p:cNvPr id="12" name="TextBox 11">
+            <a:extLst>
+              <a:ext uri="{FF2B5EF4-FFF2-40B4-BE49-F238E27FC236}">
+                <a16:creationId xmlns:a16="http://schemas.microsoft.com/office/drawing/2014/main" id="{613B6B1A-DF6B-4D47-AE95-6A175C90E745}"/>
+              </a:ext>
+            </a:extLst>
+          </p:cNvPr>
+          <p:cNvSpPr txBox="1"/>
+          <p:nvPr/>
+        </p:nvSpPr>
+        <p:spPr>
+          <a:xfrm>
+            <a:off x="572436" y="1702211"/>
+            <a:ext cx="2225724" cy="3416320"/>
+          </a:xfrm>
+          <a:prstGeom prst="rect">
+            <a:avLst/>
+          </a:prstGeom>
+          <a:noFill/>
+        </p:spPr>
+        <p:txBody>
+          <a:bodyPr wrap="square">
+            <a:spAutoFit/>
+          </a:bodyPr>
+          <a:lstStyle/>
+          <a:p>
+            <a:r>
+              <a:rPr lang="en-US" dirty="0"/>
+              <a:t>Most of the books that have highest user ratings fall in the lower price range, however, the expensive 'need' books are still receiving reasonably high reviews, so people are not </a:t>
+            </a:r>
+          </a:p>
+          <a:p>
+            <a:r>
+              <a:rPr lang="en-US" dirty="0"/>
+              <a:t>totally dissatisfied with them</a:t>
+            </a:r>
+          </a:p>
+        </p:txBody>
+      </p:sp>
     </p:spTree>
     <p:extLst>
       <p:ext uri="{BB962C8B-B14F-4D97-AF65-F5344CB8AC3E}">
@@ -5990,6 +6031,59 @@
                       </p:childTnLst>
                     </p:cTn>
                   </p:par>
+                  <p:par>
+                    <p:cTn id="33" fill="hold">
+                      <p:stCondLst>
+                        <p:cond delay="indefinite"/>
+                      </p:stCondLst>
+                      <p:childTnLst>
+                        <p:par>
+                          <p:cTn id="34" fill="hold">
+                            <p:stCondLst>
+                              <p:cond delay="0"/>
+                            </p:stCondLst>
+                            <p:childTnLst>
+                              <p:par>
+                                <p:cTn id="35" presetID="3" presetClass="entr" presetSubtype="10" fill="hold" grpId="0" nodeType="clickEffect">
+                                  <p:stCondLst>
+                                    <p:cond delay="0"/>
+                                  </p:stCondLst>
+                                  <p:childTnLst>
+                                    <p:set>
+                                      <p:cBhvr>
+                                        <p:cTn id="36" dur="1" fill="hold">
+                                          <p:stCondLst>
+                                            <p:cond delay="0"/>
+                                          </p:stCondLst>
+                                        </p:cTn>
+                                        <p:tgtEl>
+                                          <p:spTgt spid="12"/>
+                                        </p:tgtEl>
+                                        <p:attrNameLst>
+                                          <p:attrName>style.visibility</p:attrName>
+                                        </p:attrNameLst>
+                                      </p:cBhvr>
+                                      <p:to>
+                                        <p:strVal val="visible"/>
+                                      </p:to>
+                                    </p:set>
+                                    <p:animEffect transition="in" filter="blinds(horizontal)">
+                                      <p:cBhvr>
+                                        <p:cTn id="37" dur="500"/>
+                                        <p:tgtEl>
+                                          <p:spTgt spid="12"/>
+                                        </p:tgtEl>
+                                      </p:cBhvr>
+                                    </p:animEffect>
+                                  </p:childTnLst>
+                                </p:cTn>
+                              </p:par>
+                            </p:childTnLst>
+                          </p:cTn>
+                        </p:par>
+                      </p:childTnLst>
+                    </p:cTn>
+                  </p:par>
                 </p:childTnLst>
               </p:cTn>
               <p:prevCondLst>
@@ -6013,6 +6107,7 @@
     </p:tnLst>
     <p:bldLst>
       <p:bldP spid="6" grpId="0"/>
+      <p:bldP spid="12" grpId="0"/>
     </p:bldLst>
   </p:timing>
 </p:sld>
@@ -6080,7 +6175,7 @@
         <p:spPr>
           <a:xfrm>
             <a:off x="415376" y="1875789"/>
-            <a:ext cx="4525591" cy="923330"/>
+            <a:ext cx="4525591" cy="646331"/>
           </a:xfrm>
           <a:prstGeom prst="rect">
             <a:avLst/>
@@ -6106,14 +6201,6 @@
               </a:rPr>
               <a:t>Cost of books as a factor</a:t>
             </a:r>
-            <a:br>
-              <a:rPr lang="en-US" dirty="0">
-                <a:solidFill>
-                  <a:schemeClr val="tx2"/>
-                </a:solidFill>
-                <a:latin typeface="verdana" panose="020B0604030504040204" pitchFamily="34" charset="0"/>
-              </a:rPr>
-            </a:br>
             <a:endParaRPr lang="en-US" dirty="0">
               <a:solidFill>
                 <a:schemeClr val="tx2"/>
@@ -7228,7 +7315,7 @@
         <p:spPr>
           <a:xfrm>
             <a:off x="838199" y="1379621"/>
-            <a:ext cx="10968789" cy="5078313"/>
+            <a:ext cx="10968789" cy="5355312"/>
           </a:xfrm>
           <a:prstGeom prst="rect">
             <a:avLst/>
@@ -7296,7 +7383,16 @@
                 <a:effectLst/>
                 <a:latin typeface="verdana" panose="020B0604030504040204" pitchFamily="34" charset="0"/>
               </a:rPr>
-              <a:t>Smarter-Books”</a:t>
+              <a:t>Smarter-Books” </a:t>
+            </a:r>
+            <a:r>
+              <a:rPr lang="en-US" dirty="0">
+                <a:solidFill>
+                  <a:schemeClr val="tx2"/>
+                </a:solidFill>
+                <a:latin typeface="verdana" panose="020B0604030504040204" pitchFamily="34" charset="0"/>
+              </a:rPr>
+              <a:t>as well as a tiny starting budget</a:t>
             </a:r>
             <a:r>
               <a:rPr lang="en-US" sz="1800" b="0" i="0" dirty="0">
@@ -9534,42 +9630,12 @@
           <a:chExt cx="0" cy="0"/>
         </a:xfrm>
       </p:grpSpPr>
-      <p:sp>
-        <p:nvSpPr>
-          <p:cNvPr id="2" name="Title 1">
+      <p:pic>
+        <p:nvPicPr>
+          <p:cNvPr id="3" name="Picture 2">
             <a:extLst>
               <a:ext uri="{FF2B5EF4-FFF2-40B4-BE49-F238E27FC236}">
-                <a16:creationId xmlns:a16="http://schemas.microsoft.com/office/drawing/2014/main" id="{2676885E-E9F5-2B43-8D75-29C5B2B569B0}"/>
-              </a:ext>
-            </a:extLst>
-          </p:cNvPr>
-          <p:cNvSpPr>
-            <a:spLocks noGrp="1"/>
-          </p:cNvSpPr>
-          <p:nvPr>
-            <p:ph type="title"/>
-          </p:nvPr>
-        </p:nvSpPr>
-        <p:spPr/>
-        <p:txBody>
-          <a:bodyPr>
-            <a:normAutofit/>
-          </a:bodyPr>
-          <a:lstStyle/>
-          <a:p>
-            <a:r>
-              <a:rPr lang="en-US" dirty="0"/>
-              <a:t>Results</a:t>
-            </a:r>
-          </a:p>
-        </p:txBody>
-      </p:sp>
-      <p:pic>
-        <p:nvPicPr>
-          <p:cNvPr id="4" name="Picture 3">
-            <a:extLst>
-              <a:ext uri="{FF2B5EF4-FFF2-40B4-BE49-F238E27FC236}">
-                <a16:creationId xmlns:a16="http://schemas.microsoft.com/office/drawing/2014/main" id="{764031E6-A3F4-1144-8561-F7B4251B4B67}"/>
+                <a16:creationId xmlns:a16="http://schemas.microsoft.com/office/drawing/2014/main" id="{B0382121-DD86-C54D-8676-E00DF136E8A4}"/>
               </a:ext>
             </a:extLst>
           </p:cNvPr>
@@ -9578,15 +9644,16 @@
           </p:cNvPicPr>
           <p:nvPr/>
         </p:nvPicPr>
-        <p:blipFill rotWithShape="1">
+        <p:blipFill>
           <a:blip r:embed="rId2"/>
-          <a:srcRect t="1388"/>
-          <a:stretch/>
+          <a:stretch>
+            <a:fillRect/>
+          </a:stretch>
         </p:blipFill>
         <p:spPr>
           <a:xfrm>
-            <a:off x="48126" y="1379620"/>
-            <a:ext cx="11790947" cy="5252155"/>
+            <a:off x="128335" y="1233158"/>
+            <a:ext cx="11836138" cy="5170181"/>
           </a:xfrm>
           <a:prstGeom prst="rect">
             <a:avLst/>
@@ -9595,10 +9662,65 @@
       </p:pic>
       <p:sp>
         <p:nvSpPr>
-          <p:cNvPr id="3" name="TextBox 2">
+          <p:cNvPr id="4" name="Title 1">
             <a:extLst>
               <a:ext uri="{FF2B5EF4-FFF2-40B4-BE49-F238E27FC236}">
-                <a16:creationId xmlns:a16="http://schemas.microsoft.com/office/drawing/2014/main" id="{DBBA7389-268A-BF4D-A4BA-8E77A0816C40}"/>
+                <a16:creationId xmlns:a16="http://schemas.microsoft.com/office/drawing/2014/main" id="{D3EA7B2F-521D-E64D-BEE1-718BCFB09E91}"/>
+              </a:ext>
+            </a:extLst>
+          </p:cNvPr>
+          <p:cNvSpPr txBox="1">
+            <a:spLocks/>
+          </p:cNvSpPr>
+          <p:nvPr/>
+        </p:nvSpPr>
+        <p:spPr>
+          <a:xfrm>
+            <a:off x="990600" y="517525"/>
+            <a:ext cx="10515600" cy="1325563"/>
+          </a:xfrm>
+          <a:prstGeom prst="rect">
+            <a:avLst/>
+          </a:prstGeom>
+        </p:spPr>
+        <p:txBody>
+          <a:bodyPr vert="horz" lIns="91440" tIns="45720" rIns="91440" bIns="45720" rtlCol="0" anchor="ctr">
+            <a:normAutofit/>
+          </a:bodyPr>
+          <a:lstStyle>
+            <a:lvl1pPr algn="l" defTabSz="914400" rtl="0" eaLnBrk="1" latinLnBrk="0" hangingPunct="1">
+              <a:lnSpc>
+                <a:spcPct val="90000"/>
+              </a:lnSpc>
+              <a:spcBef>
+                <a:spcPct val="0"/>
+              </a:spcBef>
+              <a:buNone/>
+              <a:defRPr sz="4400" kern="1200">
+                <a:solidFill>
+                  <a:schemeClr val="tx1"/>
+                </a:solidFill>
+                <a:latin typeface="+mj-lt"/>
+                <a:ea typeface="+mj-ea"/>
+                <a:cs typeface="+mj-cs"/>
+              </a:defRPr>
+            </a:lvl1pPr>
+          </a:lstStyle>
+          <a:p>
+            <a:r>
+              <a:rPr lang="en-US"/>
+              <a:t>Results</a:t>
+            </a:r>
+            <a:endParaRPr lang="en-US" dirty="0"/>
+          </a:p>
+        </p:txBody>
+      </p:sp>
+      <p:sp>
+        <p:nvSpPr>
+          <p:cNvPr id="5" name="TextBox 4">
+            <a:extLst>
+              <a:ext uri="{FF2B5EF4-FFF2-40B4-BE49-F238E27FC236}">
+                <a16:creationId xmlns:a16="http://schemas.microsoft.com/office/drawing/2014/main" id="{F35C5217-5B7F-434F-8CBC-6A508FD469D6}"/>
               </a:ext>
             </a:extLst>
           </p:cNvPr>
@@ -9607,8 +9729,8 @@
         </p:nvSpPr>
         <p:spPr>
           <a:xfrm>
-            <a:off x="48126" y="6511277"/>
-            <a:ext cx="8368316" cy="369332"/>
+            <a:off x="128336" y="6250474"/>
+            <a:ext cx="8282524" cy="369332"/>
           </a:xfrm>
           <a:prstGeom prst="rect">
             <a:avLst/>
@@ -9628,16 +9750,58 @@
                 </a:solidFill>
                 <a:latin typeface="verdana" panose="020B0604030504040204" pitchFamily="34" charset="0"/>
               </a:rPr>
-              <a:t>Titles making top-50 rankings in past years based on count of reviews</a:t>
+              <a:t>Titles making top-50 rankings in past years based on count of ratings</a:t>
             </a:r>
             <a:endParaRPr lang="en-US" dirty="0"/>
+          </a:p>
+        </p:txBody>
+      </p:sp>
+      <p:sp>
+        <p:nvSpPr>
+          <p:cNvPr id="6" name="TextBox 5">
+            <a:extLst>
+              <a:ext uri="{FF2B5EF4-FFF2-40B4-BE49-F238E27FC236}">
+                <a16:creationId xmlns:a16="http://schemas.microsoft.com/office/drawing/2014/main" id="{20C29F97-1EA9-0043-B52D-AC23F437C4AA}"/>
+              </a:ext>
+            </a:extLst>
+          </p:cNvPr>
+          <p:cNvSpPr txBox="1"/>
+          <p:nvPr/>
+        </p:nvSpPr>
+        <p:spPr>
+          <a:xfrm>
+            <a:off x="838200" y="6508917"/>
+            <a:ext cx="8356775" cy="338554"/>
+          </a:xfrm>
+          <a:prstGeom prst="rect">
+            <a:avLst/>
+          </a:prstGeom>
+          <a:noFill/>
+        </p:spPr>
+        <p:txBody>
+          <a:bodyPr wrap="none" rtlCol="0">
+            <a:spAutoFit/>
+          </a:bodyPr>
+          <a:lstStyle/>
+          <a:p>
+            <a:pPr algn="l"/>
+            <a:r>
+              <a:rPr lang="en-US" sz="1600" b="0" i="1" dirty="0">
+                <a:solidFill>
+                  <a:schemeClr val="tx2"/>
+                </a:solidFill>
+                <a:effectLst/>
+                <a:latin typeface="verdana" panose="020B0604030504040204" pitchFamily="34" charset="0"/>
+              </a:rPr>
+              <a:t>Note: I selected top 3 instead of top 5 due to space in this presentation format</a:t>
+            </a:r>
           </a:p>
         </p:txBody>
       </p:sp>
     </p:spTree>
     <p:extLst>
       <p:ext uri="{BB962C8B-B14F-4D97-AF65-F5344CB8AC3E}">
-        <p14:creationId xmlns:p14="http://schemas.microsoft.com/office/powerpoint/2010/main" val="673584808"/>
+        <p14:creationId xmlns:p14="http://schemas.microsoft.com/office/powerpoint/2010/main" val="966699372"/>
       </p:ext>
     </p:extLst>
   </p:cSld>
@@ -9666,112 +9830,69 @@
       </p:grpSpPr>
       <p:pic>
         <p:nvPicPr>
-          <p:cNvPr id="5122" name="Picture 2">
+          <p:cNvPr id="4" name="Picture 3">
             <a:extLst>
               <a:ext uri="{FF2B5EF4-FFF2-40B4-BE49-F238E27FC236}">
-                <a16:creationId xmlns:a16="http://schemas.microsoft.com/office/drawing/2014/main" id="{57F03EA0-146C-664A-847B-280D2853427A}"/>
+                <a16:creationId xmlns:a16="http://schemas.microsoft.com/office/drawing/2014/main" id="{764031E6-A3F4-1144-8561-F7B4251B4B67}"/>
               </a:ext>
             </a:extLst>
           </p:cNvPr>
           <p:cNvPicPr>
-            <a:picLocks noChangeAspect="1" noChangeArrowheads="1"/>
+            <a:picLocks noChangeAspect="1"/>
           </p:cNvPicPr>
           <p:nvPr/>
         </p:nvPicPr>
-        <p:blipFill>
-          <a:blip r:embed="rId2">
-            <a:extLst>
-              <a:ext uri="{28A0092B-C50C-407E-A947-70E740481C1C}">
-                <a14:useLocalDpi xmlns:a14="http://schemas.microsoft.com/office/drawing/2010/main" val="0"/>
-              </a:ext>
-            </a:extLst>
-          </a:blip>
-          <a:srcRect/>
-          <a:stretch>
-            <a:fillRect/>
-          </a:stretch>
+        <p:blipFill rotWithShape="1">
+          <a:blip r:embed="rId2"/>
+          <a:srcRect t="1388"/>
+          <a:stretch/>
         </p:blipFill>
-        <p:spPr bwMode="auto">
-          <a:xfrm>
-            <a:off x="128336" y="1641474"/>
-            <a:ext cx="12063663" cy="5064125"/>
-          </a:xfrm>
-          <a:prstGeom prst="rect">
-            <a:avLst/>
-          </a:prstGeom>
-          <a:noFill/>
-          <a:extLst>
-            <a:ext uri="{909E8E84-426E-40DD-AFC4-6F175D3DCCD1}">
-              <a14:hiddenFill xmlns:a14="http://schemas.microsoft.com/office/drawing/2010/main">
-                <a:solidFill>
-                  <a:srgbClr val="FFFFFF"/>
-                </a:solidFill>
-              </a14:hiddenFill>
-            </a:ext>
-          </a:extLst>
-        </p:spPr>
-      </p:pic>
-      <p:sp>
-        <p:nvSpPr>
-          <p:cNvPr id="4" name="Title 1">
-            <a:extLst>
-              <a:ext uri="{FF2B5EF4-FFF2-40B4-BE49-F238E27FC236}">
-                <a16:creationId xmlns:a16="http://schemas.microsoft.com/office/drawing/2014/main" id="{D3EA7B2F-521D-E64D-BEE1-718BCFB09E91}"/>
-              </a:ext>
-            </a:extLst>
-          </p:cNvPr>
-          <p:cNvSpPr txBox="1">
-            <a:spLocks/>
-          </p:cNvSpPr>
-          <p:nvPr/>
-        </p:nvSpPr>
         <p:spPr>
           <a:xfrm>
-            <a:off x="990600" y="517525"/>
-            <a:ext cx="10515600" cy="1325563"/>
+            <a:off x="48126" y="1070525"/>
+            <a:ext cx="11790947" cy="5252155"/>
           </a:xfrm>
           <a:prstGeom prst="rect">
             <a:avLst/>
           </a:prstGeom>
         </p:spPr>
-        <p:txBody>
-          <a:bodyPr vert="horz" lIns="91440" tIns="45720" rIns="91440" bIns="45720" rtlCol="0" anchor="ctr">
+      </p:pic>
+      <p:sp>
+        <p:nvSpPr>
+          <p:cNvPr id="2" name="Title 1">
+            <a:extLst>
+              <a:ext uri="{FF2B5EF4-FFF2-40B4-BE49-F238E27FC236}">
+                <a16:creationId xmlns:a16="http://schemas.microsoft.com/office/drawing/2014/main" id="{2676885E-E9F5-2B43-8D75-29C5B2B569B0}"/>
+              </a:ext>
+            </a:extLst>
+          </p:cNvPr>
+          <p:cNvSpPr>
+            <a:spLocks noGrp="1"/>
+          </p:cNvSpPr>
+          <p:nvPr>
+            <p:ph type="title"/>
+          </p:nvPr>
+        </p:nvSpPr>
+        <p:spPr/>
+        <p:txBody>
+          <a:bodyPr>
             <a:normAutofit/>
           </a:bodyPr>
-          <a:lstStyle>
-            <a:lvl1pPr algn="l" defTabSz="914400" rtl="0" eaLnBrk="1" latinLnBrk="0" hangingPunct="1">
-              <a:lnSpc>
-                <a:spcPct val="90000"/>
-              </a:lnSpc>
-              <a:spcBef>
-                <a:spcPct val="0"/>
-              </a:spcBef>
-              <a:buNone/>
-              <a:defRPr sz="4400" kern="1200">
-                <a:solidFill>
-                  <a:schemeClr val="tx1"/>
-                </a:solidFill>
-                <a:latin typeface="+mj-lt"/>
-                <a:ea typeface="+mj-ea"/>
-                <a:cs typeface="+mj-cs"/>
-              </a:defRPr>
-            </a:lvl1pPr>
-          </a:lstStyle>
-          <a:p>
-            <a:r>
-              <a:rPr lang="en-US"/>
+          <a:lstStyle/>
+          <a:p>
+            <a:r>
+              <a:rPr lang="en-US" dirty="0"/>
               <a:t>Results</a:t>
             </a:r>
-            <a:endParaRPr lang="en-US" dirty="0"/>
-          </a:p>
-        </p:txBody>
-      </p:sp>
-      <p:sp>
-        <p:nvSpPr>
-          <p:cNvPr id="5" name="TextBox 4">
+          </a:p>
+        </p:txBody>
+      </p:sp>
+      <p:sp>
+        <p:nvSpPr>
+          <p:cNvPr id="3" name="TextBox 2">
             <a:extLst>
               <a:ext uri="{FF2B5EF4-FFF2-40B4-BE49-F238E27FC236}">
-                <a16:creationId xmlns:a16="http://schemas.microsoft.com/office/drawing/2014/main" id="{F35C5217-5B7F-434F-8CBC-6A508FD469D6}"/>
+                <a16:creationId xmlns:a16="http://schemas.microsoft.com/office/drawing/2014/main" id="{DBBA7389-268A-BF4D-A4BA-8E77A0816C40}"/>
               </a:ext>
             </a:extLst>
           </p:cNvPr>
@@ -9780,8 +9901,8 @@
         </p:nvSpPr>
         <p:spPr>
           <a:xfrm>
-            <a:off x="128336" y="6520933"/>
-            <a:ext cx="8282524" cy="369332"/>
+            <a:off x="48126" y="6472640"/>
+            <a:ext cx="8368316" cy="369332"/>
           </a:xfrm>
           <a:prstGeom prst="rect">
             <a:avLst/>
@@ -9801,7 +9922,7 @@
                 </a:solidFill>
                 <a:latin typeface="verdana" panose="020B0604030504040204" pitchFamily="34" charset="0"/>
               </a:rPr>
-              <a:t>Titles making top-50 rankings in past years based on count of ratings</a:t>
+              <a:t>Titles making top-50 rankings in past years based on count of reviews</a:t>
             </a:r>
             <a:endParaRPr lang="en-US" dirty="0"/>
           </a:p>
@@ -9810,7 +9931,7 @@
     </p:spTree>
     <p:extLst>
       <p:ext uri="{BB962C8B-B14F-4D97-AF65-F5344CB8AC3E}">
-        <p14:creationId xmlns:p14="http://schemas.microsoft.com/office/powerpoint/2010/main" val="966699372"/>
+        <p14:creationId xmlns:p14="http://schemas.microsoft.com/office/powerpoint/2010/main" val="673584808"/>
       </p:ext>
     </p:extLst>
   </p:cSld>
@@ -9944,8 +10065,8 @@
         </p:blipFill>
         <p:spPr bwMode="auto">
           <a:xfrm>
-            <a:off x="1229979" y="1523999"/>
-            <a:ext cx="7959171" cy="4748463"/>
+            <a:off x="2077420" y="1523999"/>
+            <a:ext cx="8206434" cy="4895981"/>
           </a:xfrm>
           <a:prstGeom prst="rect">
             <a:avLst/>
@@ -9994,10 +10115,10 @@
       </p:grpSpPr>
       <p:pic>
         <p:nvPicPr>
-          <p:cNvPr id="10" name="Picture 9">
+          <p:cNvPr id="9" name="Picture 8">
             <a:extLst>
               <a:ext uri="{FF2B5EF4-FFF2-40B4-BE49-F238E27FC236}">
-                <a16:creationId xmlns:a16="http://schemas.microsoft.com/office/drawing/2014/main" id="{CB630DAE-E10B-094E-9E6F-F374625F467A}"/>
+                <a16:creationId xmlns:a16="http://schemas.microsoft.com/office/drawing/2014/main" id="{FD86DF5E-0C6B-C441-894F-9D65A0672043}"/>
               </a:ext>
             </a:extLst>
           </p:cNvPr>
@@ -10014,8 +10135,8 @@
         </p:blipFill>
         <p:spPr>
           <a:xfrm>
-            <a:off x="1531354" y="1120775"/>
-            <a:ext cx="9321800" cy="5372100"/>
+            <a:off x="2215166" y="1552437"/>
+            <a:ext cx="8388332" cy="4940438"/>
           </a:xfrm>
           <a:prstGeom prst="rect">
             <a:avLst/>
@@ -10330,54 +10451,6 @@
           <a:chExt cx="0" cy="0"/>
         </a:xfrm>
       </p:grpSpPr>
-      <p:sp>
-        <p:nvSpPr>
-          <p:cNvPr id="3" name="TextBox 2">
-            <a:extLst>
-              <a:ext uri="{FF2B5EF4-FFF2-40B4-BE49-F238E27FC236}">
-                <a16:creationId xmlns:a16="http://schemas.microsoft.com/office/drawing/2014/main" id="{DBBA7389-268A-BF4D-A4BA-8E77A0816C40}"/>
-              </a:ext>
-            </a:extLst>
-          </p:cNvPr>
-          <p:cNvSpPr txBox="1"/>
-          <p:nvPr/>
-        </p:nvSpPr>
-        <p:spPr>
-          <a:xfrm>
-            <a:off x="185408" y="6488668"/>
-            <a:ext cx="5910592" cy="369332"/>
-          </a:xfrm>
-          <a:prstGeom prst="rect">
-            <a:avLst/>
-          </a:prstGeom>
-          <a:noFill/>
-        </p:spPr>
-        <p:txBody>
-          <a:bodyPr wrap="none" rtlCol="0">
-            <a:spAutoFit/>
-          </a:bodyPr>
-          <a:lstStyle/>
-          <a:p>
-            <a:pPr algn="l"/>
-            <a:r>
-              <a:rPr lang="en-US" sz="1800" b="0" i="0" dirty="0">
-                <a:solidFill>
-                  <a:schemeClr val="tx2"/>
-                </a:solidFill>
-                <a:effectLst/>
-                <a:latin typeface="verdana" panose="020B0604030504040204" pitchFamily="34" charset="0"/>
-              </a:rPr>
-              <a:t>Most popular books based on book review counts</a:t>
-            </a:r>
-            <a:endParaRPr lang="en-US" dirty="0">
-              <a:solidFill>
-                <a:schemeClr val="tx2"/>
-              </a:solidFill>
-              <a:latin typeface="verdana" panose="020B0604030504040204" pitchFamily="34" charset="0"/>
-            </a:endParaRPr>
-          </a:p>
-        </p:txBody>
-      </p:sp>
       <p:pic>
         <p:nvPicPr>
           <p:cNvPr id="4" name="Picture 3">
@@ -10400,7 +10473,7 @@
         </p:blipFill>
         <p:spPr>
           <a:xfrm>
-            <a:off x="1384300" y="1251284"/>
+            <a:off x="1706272" y="1423012"/>
             <a:ext cx="9423400" cy="5250322"/>
           </a:xfrm>
           <a:prstGeom prst="rect">
@@ -10408,6 +10481,54 @@
           </a:prstGeom>
         </p:spPr>
       </p:pic>
+      <p:sp>
+        <p:nvSpPr>
+          <p:cNvPr id="3" name="TextBox 2">
+            <a:extLst>
+              <a:ext uri="{FF2B5EF4-FFF2-40B4-BE49-F238E27FC236}">
+                <a16:creationId xmlns:a16="http://schemas.microsoft.com/office/drawing/2014/main" id="{DBBA7389-268A-BF4D-A4BA-8E77A0816C40}"/>
+              </a:ext>
+            </a:extLst>
+          </p:cNvPr>
+          <p:cNvSpPr txBox="1"/>
+          <p:nvPr/>
+        </p:nvSpPr>
+        <p:spPr>
+          <a:xfrm>
+            <a:off x="185408" y="6488668"/>
+            <a:ext cx="5910592" cy="369332"/>
+          </a:xfrm>
+          <a:prstGeom prst="rect">
+            <a:avLst/>
+          </a:prstGeom>
+          <a:noFill/>
+        </p:spPr>
+        <p:txBody>
+          <a:bodyPr wrap="none" rtlCol="0">
+            <a:spAutoFit/>
+          </a:bodyPr>
+          <a:lstStyle/>
+          <a:p>
+            <a:pPr algn="l"/>
+            <a:r>
+              <a:rPr lang="en-US" sz="1800" b="0" i="0" dirty="0">
+                <a:solidFill>
+                  <a:schemeClr val="tx2"/>
+                </a:solidFill>
+                <a:effectLst/>
+                <a:latin typeface="verdana" panose="020B0604030504040204" pitchFamily="34" charset="0"/>
+              </a:rPr>
+              <a:t>Most popular books based on book review counts</a:t>
+            </a:r>
+            <a:endParaRPr lang="en-US" dirty="0">
+              <a:solidFill>
+                <a:schemeClr val="tx2"/>
+              </a:solidFill>
+              <a:latin typeface="verdana" panose="020B0604030504040204" pitchFamily="34" charset="0"/>
+            </a:endParaRPr>
+          </a:p>
+        </p:txBody>
+      </p:sp>
       <p:sp>
         <p:nvSpPr>
           <p:cNvPr id="2" name="Title 1">
@@ -10497,7 +10618,7 @@
         </p:blipFill>
         <p:spPr bwMode="auto">
           <a:xfrm>
-            <a:off x="1361710" y="1251283"/>
+            <a:off x="1657924" y="1411705"/>
             <a:ext cx="9326969" cy="5261629"/>
           </a:xfrm>
           <a:prstGeom prst="rect">

</xml_diff>

<commit_message>
Typos cleanup - added details
</commit_message>
<xml_diff>
--- a/FinalProjectPresentation.pptx
+++ b/FinalProjectPresentation.pptx
@@ -5,7 +5,7 @@
     <p:sldMasterId id="2147483672" r:id="rId1"/>
   </p:sldMasterIdLst>
   <p:notesMasterIdLst>
-    <p:notesMasterId r:id="rId20"/>
+    <p:notesMasterId r:id="rId21"/>
   </p:notesMasterIdLst>
   <p:sldIdLst>
     <p:sldId id="257" r:id="rId2"/>
@@ -24,8 +24,9 @@
     <p:sldId id="278" r:id="rId15"/>
     <p:sldId id="280" r:id="rId16"/>
     <p:sldId id="281" r:id="rId17"/>
-    <p:sldId id="287" r:id="rId18"/>
-    <p:sldId id="266" r:id="rId19"/>
+    <p:sldId id="288" r:id="rId18"/>
+    <p:sldId id="287" r:id="rId19"/>
+    <p:sldId id="266" r:id="rId20"/>
   </p:sldIdLst>
   <p:sldSz cx="12192000" cy="6858000"/>
   <p:notesSz cx="6858000" cy="9144000"/>
@@ -295,7 +296,7 @@
           <a:p>
             <a:fld id="{BC1C655F-54C7-4D03-AD26-E0C40F01563A}" type="datetimeFigureOut">
               <a:rPr lang="id-ID" smtClean="0"/>
-              <a:t>12/12/23</a:t>
+              <a:t>13/12/23</a:t>
             </a:fld>
             <a:endParaRPr lang="id-ID"/>
           </a:p>
@@ -694,7 +695,7 @@
           <a:p>
             <a:fld id="{14F96FE2-9E77-4834-9C6B-212E1056298F}" type="datetimeFigureOut">
               <a:rPr lang="en-US" smtClean="0"/>
-              <a:t>12/12/23</a:t>
+              <a:t>12/13/23</a:t>
             </a:fld>
             <a:endParaRPr lang="en-US" dirty="0"/>
           </a:p>
@@ -951,7 +952,7 @@
           <a:p>
             <a:fld id="{14F96FE2-9E77-4834-9C6B-212E1056298F}" type="datetimeFigureOut">
               <a:rPr lang="en-US" smtClean="0"/>
-              <a:t>12/12/23</a:t>
+              <a:t>12/13/23</a:t>
             </a:fld>
             <a:endParaRPr lang="en-US" dirty="0"/>
           </a:p>
@@ -1121,7 +1122,7 @@
           <a:p>
             <a:fld id="{14F96FE2-9E77-4834-9C6B-212E1056298F}" type="datetimeFigureOut">
               <a:rPr lang="en-US" smtClean="0"/>
-              <a:t>12/12/23</a:t>
+              <a:t>12/13/23</a:t>
             </a:fld>
             <a:endParaRPr lang="en-US" dirty="0"/>
           </a:p>
@@ -1301,7 +1302,7 @@
           <a:p>
             <a:fld id="{14F96FE2-9E77-4834-9C6B-212E1056298F}" type="datetimeFigureOut">
               <a:rPr lang="en-US" smtClean="0"/>
-              <a:t>12/12/23</a:t>
+              <a:t>12/13/23</a:t>
             </a:fld>
             <a:endParaRPr lang="en-US" dirty="0"/>
           </a:p>
@@ -1471,7 +1472,7 @@
           <a:p>
             <a:fld id="{14F96FE2-9E77-4834-9C6B-212E1056298F}" type="datetimeFigureOut">
               <a:rPr lang="en-US" smtClean="0"/>
-              <a:t>12/12/23</a:t>
+              <a:t>12/13/23</a:t>
             </a:fld>
             <a:endParaRPr lang="en-US" dirty="0"/>
           </a:p>
@@ -1717,7 +1718,7 @@
           <a:p>
             <a:fld id="{14F96FE2-9E77-4834-9C6B-212E1056298F}" type="datetimeFigureOut">
               <a:rPr lang="en-US" smtClean="0"/>
-              <a:t>12/12/23</a:t>
+              <a:t>12/13/23</a:t>
             </a:fld>
             <a:endParaRPr lang="en-US" dirty="0"/>
           </a:p>
@@ -1949,7 +1950,7 @@
           <a:p>
             <a:fld id="{14F96FE2-9E77-4834-9C6B-212E1056298F}" type="datetimeFigureOut">
               <a:rPr lang="en-US" smtClean="0"/>
-              <a:t>12/12/23</a:t>
+              <a:t>12/13/23</a:t>
             </a:fld>
             <a:endParaRPr lang="en-US" dirty="0"/>
           </a:p>
@@ -2316,7 +2317,7 @@
           <a:p>
             <a:fld id="{14F96FE2-9E77-4834-9C6B-212E1056298F}" type="datetimeFigureOut">
               <a:rPr lang="en-US" smtClean="0"/>
-              <a:t>12/12/23</a:t>
+              <a:t>12/13/23</a:t>
             </a:fld>
             <a:endParaRPr lang="en-US" dirty="0"/>
           </a:p>
@@ -2434,7 +2435,7 @@
           <a:p>
             <a:fld id="{14F96FE2-9E77-4834-9C6B-212E1056298F}" type="datetimeFigureOut">
               <a:rPr lang="en-US" smtClean="0"/>
-              <a:t>12/12/23</a:t>
+              <a:t>12/13/23</a:t>
             </a:fld>
             <a:endParaRPr lang="en-US" dirty="0"/>
           </a:p>
@@ -2529,7 +2530,7 @@
           <a:p>
             <a:fld id="{14F96FE2-9E77-4834-9C6B-212E1056298F}" type="datetimeFigureOut">
               <a:rPr lang="en-US" smtClean="0"/>
-              <a:t>12/12/23</a:t>
+              <a:t>12/13/23</a:t>
             </a:fld>
             <a:endParaRPr lang="en-US" dirty="0"/>
           </a:p>
@@ -2832,7 +2833,7 @@
           <a:p>
             <a:fld id="{14F96FE2-9E77-4834-9C6B-212E1056298F}" type="datetimeFigureOut">
               <a:rPr lang="en-US" smtClean="0"/>
-              <a:t>12/12/23</a:t>
+              <a:t>12/13/23</a:t>
             </a:fld>
             <a:endParaRPr lang="en-US" dirty="0"/>
           </a:p>
@@ -3525,7 +3526,7 @@
           <a:p>
             <a:fld id="{14F96FE2-9E77-4834-9C6B-212E1056298F}" type="datetimeFigureOut">
               <a:rPr lang="en-US" smtClean="0"/>
-              <a:t>12/12/23</a:t>
+              <a:t>12/13/23</a:t>
             </a:fld>
             <a:endParaRPr lang="en-US" dirty="0"/>
           </a:p>
@@ -3738,7 +3739,7 @@
           <a:p>
             <a:fld id="{14F96FE2-9E77-4834-9C6B-212E1056298F}" type="datetimeFigureOut">
               <a:rPr lang="en-US" smtClean="0"/>
-              <a:t>12/12/23</a:t>
+              <a:t>12/13/23</a:t>
             </a:fld>
             <a:endParaRPr lang="en-US" dirty="0"/>
           </a:p>
@@ -6728,6 +6729,205 @@
       </p:grpSpPr>
       <p:sp>
         <p:nvSpPr>
+          <p:cNvPr id="3" name="TextBox 2">
+            <a:extLst>
+              <a:ext uri="{FF2B5EF4-FFF2-40B4-BE49-F238E27FC236}">
+                <a16:creationId xmlns:a16="http://schemas.microsoft.com/office/drawing/2014/main" id="{733CB21F-B841-2A40-A1AB-52A449584566}"/>
+              </a:ext>
+            </a:extLst>
+          </p:cNvPr>
+          <p:cNvSpPr txBox="1"/>
+          <p:nvPr/>
+        </p:nvSpPr>
+        <p:spPr>
+          <a:xfrm>
+            <a:off x="925669" y="1497505"/>
+            <a:ext cx="10340661" cy="3447098"/>
+          </a:xfrm>
+          <a:prstGeom prst="rect">
+            <a:avLst/>
+          </a:prstGeom>
+          <a:noFill/>
+        </p:spPr>
+        <p:txBody>
+          <a:bodyPr wrap="square" rtlCol="0">
+            <a:spAutoFit/>
+          </a:bodyPr>
+          <a:lstStyle/>
+          <a:p>
+            <a:pPr marL="0" marR="0">
+              <a:spcBef>
+                <a:spcPts val="0"/>
+              </a:spcBef>
+              <a:spcAft>
+                <a:spcPts val="0"/>
+              </a:spcAft>
+            </a:pPr>
+            <a:r>
+              <a:rPr lang="en-US" sz="2000" dirty="0"/>
+              <a:t>My recommendations for the client are as follows:</a:t>
+            </a:r>
+          </a:p>
+          <a:p>
+            <a:pPr marL="342900" marR="0" lvl="0" indent="-342900">
+              <a:spcBef>
+                <a:spcPts val="0"/>
+              </a:spcBef>
+              <a:spcAft>
+                <a:spcPts val="0"/>
+              </a:spcAft>
+              <a:buFont typeface="Symbol" pitchFamily="2" charset="2"/>
+              <a:buChar char=""/>
+            </a:pPr>
+            <a:r>
+              <a:rPr lang="en-US" sz="2000" dirty="0"/>
+              <a:t>Purchase all of the series of books that are in the top 50, most reviewed or most rated results, </a:t>
+            </a:r>
+            <a:r>
+              <a:rPr lang="en-US" sz="2000" dirty="0" err="1"/>
+              <a:t>ie</a:t>
+            </a:r>
+            <a:r>
+              <a:rPr lang="en-US" sz="2000" dirty="0"/>
+              <a:t>. If three Harry Potter books are listed, purchase more of the three making the list, but have some of all in hand of all others in that series.</a:t>
+            </a:r>
+          </a:p>
+          <a:p>
+            <a:pPr marL="342900" marR="0" lvl="0" indent="-342900">
+              <a:spcBef>
+                <a:spcPts val="0"/>
+              </a:spcBef>
+              <a:spcAft>
+                <a:spcPts val="0"/>
+              </a:spcAft>
+              <a:buFont typeface="Symbol" pitchFamily="2" charset="2"/>
+              <a:buChar char=""/>
+            </a:pPr>
+            <a:r>
+              <a:rPr lang="en-US" sz="2000" dirty="0"/>
+              <a:t>Purchase books from the most reviewed / rated authors, starting with those that are higher rated</a:t>
+            </a:r>
+          </a:p>
+          <a:p>
+            <a:pPr marL="342900" marR="0" lvl="0" indent="-342900">
+              <a:spcBef>
+                <a:spcPts val="0"/>
+              </a:spcBef>
+              <a:spcAft>
+                <a:spcPts val="0"/>
+              </a:spcAft>
+              <a:buFont typeface="Symbol" pitchFamily="2" charset="2"/>
+              <a:buChar char=""/>
+            </a:pPr>
+            <a:r>
+              <a:rPr lang="en-US" sz="2000" dirty="0"/>
+              <a:t>Fiction is a bit more popular than non-fiction, but non-fiction titles that are highly reviewed or rated should be kept on hand. </a:t>
+            </a:r>
+          </a:p>
+          <a:p>
+            <a:pPr marL="342900" marR="0" lvl="0" indent="-342900">
+              <a:spcBef>
+                <a:spcPts val="0"/>
+              </a:spcBef>
+              <a:spcAft>
+                <a:spcPts val="0"/>
+              </a:spcAft>
+              <a:buFont typeface="Symbol" pitchFamily="2" charset="2"/>
+              <a:buChar char=""/>
+            </a:pPr>
+            <a:r>
+              <a:rPr lang="en-US" sz="2000" dirty="0"/>
+              <a:t>Purchase titles that received top 50% or review and rating counts</a:t>
+            </a:r>
+          </a:p>
+          <a:p>
+            <a:pPr marL="342900" marR="0" lvl="0" indent="-342900">
+              <a:spcBef>
+                <a:spcPts val="0"/>
+              </a:spcBef>
+              <a:spcAft>
+                <a:spcPts val="0"/>
+              </a:spcAft>
+              <a:buFont typeface="Symbol" pitchFamily="2" charset="2"/>
+              <a:buChar char=""/>
+            </a:pPr>
+            <a:r>
+              <a:rPr lang="en-US" sz="2000" dirty="0"/>
+              <a:t>Purchase all titles that are in the top 50 of previews 10 years</a:t>
+            </a:r>
+          </a:p>
+          <a:p>
+            <a:endParaRPr lang="en-US" dirty="0"/>
+          </a:p>
+        </p:txBody>
+      </p:sp>
+      <p:sp>
+        <p:nvSpPr>
+          <p:cNvPr id="4" name="Title 1">
+            <a:extLst>
+              <a:ext uri="{FF2B5EF4-FFF2-40B4-BE49-F238E27FC236}">
+                <a16:creationId xmlns:a16="http://schemas.microsoft.com/office/drawing/2014/main" id="{1FC2F618-CCC2-564F-9A09-BB7775380BAD}"/>
+              </a:ext>
+            </a:extLst>
+          </p:cNvPr>
+          <p:cNvSpPr>
+            <a:spLocks noGrp="1"/>
+          </p:cNvSpPr>
+          <p:nvPr>
+            <p:ph type="title"/>
+          </p:nvPr>
+        </p:nvSpPr>
+        <p:spPr>
+          <a:xfrm>
+            <a:off x="838200" y="365125"/>
+            <a:ext cx="10515600" cy="1325563"/>
+          </a:xfrm>
+        </p:spPr>
+        <p:txBody>
+          <a:bodyPr>
+            <a:normAutofit/>
+          </a:bodyPr>
+          <a:lstStyle/>
+          <a:p>
+            <a:r>
+              <a:rPr lang="en-US" dirty="0"/>
+              <a:t>Recommendations</a:t>
+            </a:r>
+          </a:p>
+        </p:txBody>
+      </p:sp>
+    </p:spTree>
+    <p:extLst>
+      <p:ext uri="{BB962C8B-B14F-4D97-AF65-F5344CB8AC3E}">
+        <p14:creationId xmlns:p14="http://schemas.microsoft.com/office/powerpoint/2010/main" val="4261974100"/>
+      </p:ext>
+    </p:extLst>
+  </p:cSld>
+  <p:clrMapOvr>
+    <a:masterClrMapping/>
+  </p:clrMapOvr>
+</p:sld>
+</file>
+
+<file path=ppt/slides/slide18.xml><?xml version="1.0" encoding="utf-8"?>
+<p:sld xmlns:a="http://schemas.openxmlformats.org/drawingml/2006/main" xmlns:r="http://schemas.openxmlformats.org/officeDocument/2006/relationships" xmlns:p="http://schemas.openxmlformats.org/presentationml/2006/main">
+  <p:cSld>
+    <p:spTree>
+      <p:nvGrpSpPr>
+        <p:cNvPr id="1" name=""/>
+        <p:cNvGrpSpPr/>
+        <p:nvPr/>
+      </p:nvGrpSpPr>
+      <p:grpSpPr>
+        <a:xfrm>
+          <a:off x="0" y="0"/>
+          <a:ext cx="0" cy="0"/>
+          <a:chOff x="0" y="0"/>
+          <a:chExt cx="0" cy="0"/>
+        </a:xfrm>
+      </p:grpSpPr>
+      <p:sp>
+        <p:nvSpPr>
           <p:cNvPr id="7" name="Title 1">
             <a:extLst>
               <a:ext uri="{FF2B5EF4-FFF2-40B4-BE49-F238E27FC236}">
@@ -6901,7 +7101,7 @@
             </a:pPr>
             <a:r>
               <a:rPr lang="en-US" sz="2000" dirty="0"/>
-              <a:t>Call you the least popular books</a:t>
+              <a:t>Call out the least popular books</a:t>
             </a:r>
           </a:p>
           <a:p>
@@ -6932,7 +7132,7 @@
 </p:sld>
 </file>
 
-<file path=ppt/slides/slide18.xml><?xml version="1.0" encoding="utf-8"?>
+<file path=ppt/slides/slide19.xml><?xml version="1.0" encoding="utf-8"?>
 <p:sld xmlns:a="http://schemas.openxmlformats.org/drawingml/2006/main" xmlns:r="http://schemas.openxmlformats.org/officeDocument/2006/relationships" xmlns:p="http://schemas.openxmlformats.org/presentationml/2006/main">
   <p:cSld>
     <p:spTree>

</xml_diff>